<commit_message>
member1: update no backlog e review do use case
</commit_message>
<xml_diff>
--- a/scrum/Phase1/mergeddoc_deliverable_phase1.pptx
+++ b/scrum/Phase1/mergeddoc_deliverable_phase1.pptx
@@ -115,6 +115,11 @@
       </a:defRPr>
     </a:lvl9pPr>
   </p:defaultTextStyle>
+  <p:extLst>
+    <p:ext uri="{EFAFB233-063F-42B5-8137-9DF3F51BA10A}">
+      <p15:sldGuideLst xmlns:p15="http://schemas.microsoft.com/office/powerpoint/2012/main"/>
+    </p:ext>
+  </p:extLst>
 </p:presentation>
 </file>
 
@@ -3371,7 +3376,7 @@
           <a:graphicData uri="http://schemas.openxmlformats.org/presentationml/2006/ole">
             <mc:AlternateContent xmlns:mc="http://schemas.openxmlformats.org/markup-compatibility/2006">
               <mc:Choice xmlns:v="urn:schemas-microsoft-com:vml" Requires="v">
-                <p:oleObj spid="_x0000_s1041" name="Objeto da Shell do Packager" showAsIcon="1" r:id="rId3" imgW="1912680" imgH="522000" progId="Package">
+                <p:oleObj spid="_x0000_s1047" name="Objeto da Shell do Packager" showAsIcon="1" r:id="rId3" imgW="1912680" imgH="522000" progId="Package">
                   <p:embed/>
                 </p:oleObj>
               </mc:Choice>
@@ -3516,7 +3521,7 @@
           <a:graphicData uri="http://schemas.openxmlformats.org/presentationml/2006/ole">
             <mc:AlternateContent xmlns:mc="http://schemas.openxmlformats.org/markup-compatibility/2006">
               <mc:Choice xmlns:v="urn:schemas-microsoft-com:vml" Requires="v">
-                <p:oleObj spid="_x0000_s1042" name="Objeto da Shell do Packager" showAsIcon="1" r:id="rId5" imgW="1692720" imgH="522000" progId="Package">
+                <p:oleObj spid="_x0000_s1048" name="Objeto da Shell do Packager" showAsIcon="1" r:id="rId5" imgW="1692720" imgH="522000" progId="Package">
                   <p:embed/>
                 </p:oleObj>
               </mc:Choice>
@@ -3911,7 +3916,7 @@
           <a:graphicData uri="http://schemas.openxmlformats.org/presentationml/2006/ole">
             <mc:AlternateContent xmlns:mc="http://schemas.openxmlformats.org/markup-compatibility/2006">
               <mc:Choice xmlns:v="urn:schemas-microsoft-com:vml" Requires="v">
-                <p:oleObj spid="_x0000_s1043" name="Objeto da Shell do Packager" showAsIcon="1" r:id="rId7" imgW="1692720" imgH="522000" progId="Package">
+                <p:oleObj spid="_x0000_s1049" name="Objeto da Shell do Packager" showAsIcon="1" r:id="rId7" imgW="1692720" imgH="522000" progId="Package">
                   <p:embed/>
                 </p:oleObj>
               </mc:Choice>
@@ -4062,7 +4067,7 @@
           <a:graphicData uri="http://schemas.openxmlformats.org/presentationml/2006/ole">
             <mc:AlternateContent xmlns:mc="http://schemas.openxmlformats.org/markup-compatibility/2006">
               <mc:Choice xmlns:v="urn:schemas-microsoft-com:vml" Requires="v">
-                <p:oleObj spid="_x0000_s1044" name="Objeto da Shell do Packager" showAsIcon="1" r:id="rId9" imgW="1654200" imgH="522000" progId="Package">
+                <p:oleObj spid="_x0000_s1050" name="Objeto da Shell do Packager" showAsIcon="1" r:id="rId9" imgW="1654200" imgH="522000" progId="Package">
                   <p:embed/>
                 </p:oleObj>
               </mc:Choice>
@@ -4418,7 +4423,7 @@
           <a:graphicData uri="http://schemas.openxmlformats.org/presentationml/2006/ole">
             <mc:AlternateContent xmlns:mc="http://schemas.openxmlformats.org/markup-compatibility/2006">
               <mc:Choice xmlns:v="urn:schemas-microsoft-com:vml" Requires="v">
-                <p:oleObj spid="_x0000_s1045" name="Objeto da Shell do Packager" showAsIcon="1" r:id="rId11" imgW="1214280" imgH="522000" progId="Package">
+                <p:oleObj spid="_x0000_s1051" name="Objeto da Shell do Packager" showAsIcon="1" r:id="rId11" imgW="1214280" imgH="522000" progId="Package">
                   <p:embed/>
                 </p:oleObj>
               </mc:Choice>
@@ -4569,7 +4574,7 @@
           <a:graphicData uri="http://schemas.openxmlformats.org/presentationml/2006/ole">
             <mc:AlternateContent xmlns:mc="http://schemas.openxmlformats.org/markup-compatibility/2006">
               <mc:Choice xmlns:v="urn:schemas-microsoft-com:vml" Requires="v">
-                <p:oleObj spid="_x0000_s1046" name="Objeto da Shell do Packager" showAsIcon="1" r:id="rId13" imgW="478080" imgH="522000" progId="Package">
+                <p:oleObj spid="_x0000_s1052" name="Objeto da Shell do Packager" showAsIcon="1" r:id="rId13" imgW="478080" imgH="522000" progId="Package">
                   <p:embed/>
                 </p:oleObj>
               </mc:Choice>
@@ -6239,7 +6244,7 @@
           <a:graphicData uri="http://schemas.openxmlformats.org/presentationml/2006/ole">
             <mc:AlternateContent xmlns:mc="http://schemas.openxmlformats.org/markup-compatibility/2006">
               <mc:Choice xmlns:v="urn:schemas-microsoft-com:vml" Requires="v">
-                <p:oleObj spid="_x0000_s7177" name="Objeto da Shell do Packager" showAsIcon="1" r:id="rId3" imgW="965436" imgH="626553" progId="Package">
+                <p:oleObj spid="_x0000_s7181" name="Objeto da Shell do Packager" showAsIcon="1" r:id="rId3" imgW="965436" imgH="626553" progId="Package">
                   <p:embed/>
                 </p:oleObj>
               </mc:Choice>
@@ -7217,7 +7222,7 @@
           <a:graphicData uri="http://schemas.openxmlformats.org/presentationml/2006/ole">
             <mc:AlternateContent xmlns:mc="http://schemas.openxmlformats.org/markup-compatibility/2006">
               <mc:Choice xmlns:v="urn:schemas-microsoft-com:vml" Requires="v">
-                <p:oleObj spid="_x0000_s7178" name="Objeto da Shell do Packager" showAsIcon="1" r:id="rId5" imgW="965436" imgH="626553" progId="Package">
+                <p:oleObj spid="_x0000_s7182" name="Objeto da Shell do Packager" showAsIcon="1" r:id="rId5" imgW="965436" imgH="626553" progId="Package">
                   <p:embed/>
                 </p:oleObj>
               </mc:Choice>
@@ -7769,7 +7774,7 @@
           <a:graphicData uri="http://schemas.openxmlformats.org/presentationml/2006/ole">
             <mc:AlternateContent xmlns:mc="http://schemas.openxmlformats.org/markup-compatibility/2006">
               <mc:Choice xmlns:v="urn:schemas-microsoft-com:vml" Requires="v">
-                <p:oleObj spid="_x0000_s7179" name="Objeto da Shell do Packager" showAsIcon="1" r:id="rId7" imgW="965436" imgH="626553" progId="Package">
+                <p:oleObj spid="_x0000_s7183" name="Objeto da Shell do Packager" showAsIcon="1" r:id="rId7" imgW="965436" imgH="626553" progId="Package">
                   <p:embed/>
                 </p:oleObj>
               </mc:Choice>
@@ -7920,7 +7925,7 @@
           <a:graphicData uri="http://schemas.openxmlformats.org/presentationml/2006/ole">
             <mc:AlternateContent xmlns:mc="http://schemas.openxmlformats.org/markup-compatibility/2006">
               <mc:Choice xmlns:v="urn:schemas-microsoft-com:vml" Requires="v">
-                <p:oleObj spid="_x0000_s7180" name="Objeto da Shell do Packager" showAsIcon="1" r:id="rId9" imgW="965436" imgH="626553" progId="Package">
+                <p:oleObj spid="_x0000_s7184" name="Objeto da Shell do Packager" showAsIcon="1" r:id="rId9" imgW="965436" imgH="626553" progId="Package">
                   <p:embed/>
                 </p:oleObj>
               </mc:Choice>
@@ -8325,7 +8330,7 @@
           <a:graphicData uri="http://schemas.openxmlformats.org/presentationml/2006/ole">
             <mc:AlternateContent xmlns:mc="http://schemas.openxmlformats.org/markup-compatibility/2006">
               <mc:Choice xmlns:v="urn:schemas-microsoft-com:vml" Requires="v">
-                <p:oleObj spid="_x0000_s2051" name="Objeto da Shell do Packager" showAsIcon="1" r:id="rId3" imgW="935280" imgH="437400" progId="Package">
+                <p:oleObj spid="_x0000_s2052" name="Objeto da Shell do Packager" showAsIcon="1" r:id="rId3" imgW="935280" imgH="437400" progId="Package">
                   <p:embed/>
                 </p:oleObj>
               </mc:Choice>
@@ -13111,7 +13116,7 @@
           <a:graphicData uri="http://schemas.openxmlformats.org/presentationml/2006/ole">
             <mc:AlternateContent xmlns:mc="http://schemas.openxmlformats.org/markup-compatibility/2006">
               <mc:Choice xmlns:v="urn:schemas-microsoft-com:vml" Requires="v">
-                <p:oleObj spid="_x0000_s4102" name="Objeto da Shell do Packager" showAsIcon="1" r:id="rId4" imgW="965436" imgH="626553" progId="Package">
+                <p:oleObj spid="_x0000_s4103" name="Objeto da Shell do Packager" showAsIcon="1" r:id="rId4" imgW="965436" imgH="626553" progId="Package">
                   <p:embed/>
                 </p:oleObj>
               </mc:Choice>
@@ -14145,7 +14150,7 @@
           <a:graphicData uri="http://schemas.openxmlformats.org/presentationml/2006/ole">
             <mc:AlternateContent xmlns:mc="http://schemas.openxmlformats.org/markup-compatibility/2006">
               <mc:Choice xmlns:v="urn:schemas-microsoft-com:vml" Requires="v">
-                <p:oleObj spid="_x0000_s5131" name="Objeto da Shell do Packager" showAsIcon="1" r:id="rId3" imgW="1367280" imgH="522000" progId="Package">
+                <p:oleObj spid="_x0000_s5136" name="Objeto da Shell do Packager" showAsIcon="1" r:id="rId3" imgW="1367280" imgH="522000" progId="Package">
                   <p:embed/>
                 </p:oleObj>
               </mc:Choice>
@@ -14213,8 +14218,8 @@
         </p:nvSpPr>
         <p:spPr>
           <a:xfrm>
-            <a:off x="905163" y="2808143"/>
-            <a:ext cx="9836727" cy="1008738"/>
+            <a:off x="905163" y="2740812"/>
+            <a:ext cx="9836727" cy="1225720"/>
           </a:xfrm>
           <a:prstGeom prst="rect">
             <a:avLst/>
@@ -14375,7 +14380,7 @@
                 <a:ea typeface="Calibri" panose="020F0502020204030204" pitchFamily="34" charset="0"/>
                 <a:cs typeface="Times New Roman" panose="02020603050405020304" pitchFamily="18" charset="0"/>
               </a:rPr>
-              <a:t>é a classe criadora, o produto é a interface </a:t>
+              <a:t>é a classe criadora, o produto pode ser considerado a interface </a:t>
             </a:r>
             <a:r>
               <a:rPr lang="pt-PT" sz="1200" i="1" dirty="0" err="1">
@@ -14420,7 +14425,25 @@
                 <a:ea typeface="Calibri" panose="020F0502020204030204" pitchFamily="34" charset="0"/>
                 <a:cs typeface="Times New Roman" panose="02020603050405020304" pitchFamily="18" charset="0"/>
               </a:rPr>
-              <a:t>), aqui a classe criadora</a:t>
+              <a:t>) visto que esta é comum a todos os objetos criados e os outros parâmetros passados são classes java como o </a:t>
+            </a:r>
+            <a:r>
+              <a:rPr lang="pt-PT" sz="1200" dirty="0" err="1">
+                <a:effectLst/>
+                <a:latin typeface="Times New Roman" panose="02020603050405020304" pitchFamily="18" charset="0"/>
+                <a:ea typeface="Calibri" panose="020F0502020204030204" pitchFamily="34" charset="0"/>
+                <a:cs typeface="Times New Roman" panose="02020603050405020304" pitchFamily="18" charset="0"/>
+              </a:rPr>
+              <a:t>command</a:t>
+            </a:r>
+            <a:r>
+              <a:rPr lang="pt-PT" sz="1200" dirty="0">
+                <a:effectLst/>
+                <a:latin typeface="Times New Roman" panose="02020603050405020304" pitchFamily="18" charset="0"/>
+                <a:ea typeface="Calibri" panose="020F0502020204030204" pitchFamily="34" charset="0"/>
+                <a:cs typeface="Times New Roman" panose="02020603050405020304" pitchFamily="18" charset="0"/>
+              </a:rPr>
+              <a:t>, aqui a classe criadora</a:t>
             </a:r>
             <a:r>
               <a:rPr lang="pt-PT" sz="1200" dirty="0">
@@ -14441,50 +14464,8 @@
                 <a:ea typeface="Calibri" panose="020F0502020204030204" pitchFamily="34" charset="0"/>
                 <a:cs typeface="Times New Roman" panose="02020603050405020304" pitchFamily="18" charset="0"/>
               </a:rPr>
-              <a:t>, no caso as diferentes implementações que utilizam objetos do tipo </a:t>
-            </a:r>
-            <a:r>
-              <a:rPr lang="pt-PT" sz="1200" i="1" dirty="0" err="1">
-                <a:effectLst/>
-                <a:latin typeface="Times New Roman" panose="02020603050405020304" pitchFamily="18" charset="0"/>
-                <a:ea typeface="Calibri" panose="020F0502020204030204" pitchFamily="34" charset="0"/>
-                <a:cs typeface="Times New Roman" panose="02020603050405020304" pitchFamily="18" charset="0"/>
-              </a:rPr>
-              <a:t>Actions</a:t>
-            </a:r>
-            <a:r>
-              <a:rPr lang="pt-PT" sz="1200" i="1" dirty="0">
-                <a:effectLst/>
-                <a:latin typeface="Times New Roman" panose="02020603050405020304" pitchFamily="18" charset="0"/>
-                <a:ea typeface="Calibri" panose="020F0502020204030204" pitchFamily="34" charset="0"/>
-                <a:cs typeface="Times New Roman" panose="02020603050405020304" pitchFamily="18" charset="0"/>
-              </a:rPr>
-              <a:t> </a:t>
-            </a:r>
-            <a:r>
-              <a:rPr lang="pt-PT" sz="1200" dirty="0">
-                <a:effectLst/>
-                <a:latin typeface="Times New Roman" panose="02020603050405020304" pitchFamily="18" charset="0"/>
-                <a:ea typeface="Calibri" panose="020F0502020204030204" pitchFamily="34" charset="0"/>
-                <a:cs typeface="Times New Roman" panose="02020603050405020304" pitchFamily="18" charset="0"/>
-              </a:rPr>
-              <a:t>como botões e menus</a:t>
-            </a:r>
-            <a:r>
-              <a:rPr lang="pt-PT" sz="1200" i="1" dirty="0">
-                <a:effectLst/>
-                <a:latin typeface="Times New Roman" panose="02020603050405020304" pitchFamily="18" charset="0"/>
-                <a:ea typeface="Calibri" panose="020F0502020204030204" pitchFamily="34" charset="0"/>
-                <a:cs typeface="Times New Roman" panose="02020603050405020304" pitchFamily="18" charset="0"/>
-              </a:rPr>
-              <a:t>.</a:t>
-            </a:r>
-            <a:endParaRPr lang="pt-PT" sz="1200" dirty="0">
-              <a:effectLst/>
-              <a:latin typeface="Times New Roman" panose="02020603050405020304" pitchFamily="18" charset="0"/>
-              <a:ea typeface="Calibri" panose="020F0502020204030204" pitchFamily="34" charset="0"/>
-              <a:cs typeface="Times New Roman" panose="02020603050405020304" pitchFamily="18" charset="0"/>
-            </a:endParaRPr>
+              <a:t>, no caso podem ser criados menus e botões que podem realizar diversas ações.  </a:t>
+            </a:r>
           </a:p>
         </p:txBody>
       </p:sp>
@@ -14585,7 +14566,7 @@
           <a:graphicData uri="http://schemas.openxmlformats.org/presentationml/2006/ole">
             <mc:AlternateContent xmlns:mc="http://schemas.openxmlformats.org/markup-compatibility/2006">
               <mc:Choice xmlns:v="urn:schemas-microsoft-com:vml" Requires="v">
-                <p:oleObj spid="_x0000_s5132" name="Objeto da Shell do Packager" showAsIcon="1" r:id="rId5" imgW="1176120" imgH="522000" progId="Package">
+                <p:oleObj spid="_x0000_s5137" name="Objeto da Shell do Packager" showAsIcon="1" r:id="rId5" imgW="1176120" imgH="522000" progId="Package">
                   <p:embed/>
                 </p:oleObj>
               </mc:Choice>
@@ -14736,7 +14717,7 @@
           <a:graphicData uri="http://schemas.openxmlformats.org/presentationml/2006/ole">
             <mc:AlternateContent xmlns:mc="http://schemas.openxmlformats.org/markup-compatibility/2006">
               <mc:Choice xmlns:v="urn:schemas-microsoft-com:vml" Requires="v">
-                <p:oleObj spid="_x0000_s5133" name="Objeto da Shell do Packager" showAsIcon="1" r:id="rId7" imgW="717120" imgH="522000" progId="Package">
+                <p:oleObj spid="_x0000_s5138" name="Objeto da Shell do Packager" showAsIcon="1" r:id="rId7" imgW="717120" imgH="522000" progId="Package">
                   <p:embed/>
                 </p:oleObj>
               </mc:Choice>
@@ -15158,7 +15139,7 @@
           <a:graphicData uri="http://schemas.openxmlformats.org/presentationml/2006/ole">
             <mc:AlternateContent xmlns:mc="http://schemas.openxmlformats.org/markup-compatibility/2006">
               <mc:Choice xmlns:v="urn:schemas-microsoft-com:vml" Requires="v">
-                <p:oleObj spid="_x0000_s5134" name="Objeto da Shell do Packager" showAsIcon="1" r:id="rId9" imgW="1214280" imgH="522000" progId="Package">
+                <p:oleObj spid="_x0000_s5139" name="Objeto da Shell do Packager" showAsIcon="1" r:id="rId9" imgW="1214280" imgH="522000" progId="Package">
                   <p:embed/>
                 </p:oleObj>
               </mc:Choice>
@@ -15309,7 +15290,7 @@
           <a:graphicData uri="http://schemas.openxmlformats.org/presentationml/2006/ole">
             <mc:AlternateContent xmlns:mc="http://schemas.openxmlformats.org/markup-compatibility/2006">
               <mc:Choice xmlns:v="urn:schemas-microsoft-com:vml" Requires="v">
-                <p:oleObj spid="_x0000_s5135" name="Objeto da Shell do Packager" showAsIcon="1" r:id="rId11" imgW="1357920" imgH="522000" progId="Package">
+                <p:oleObj spid="_x0000_s5140" name="Objeto da Shell do Packager" showAsIcon="1" r:id="rId11" imgW="1357920" imgH="522000" progId="Package">
                   <p:embed/>
                 </p:oleObj>
               </mc:Choice>
@@ -16525,7 +16506,7 @@
           <a:graphicData uri="http://schemas.openxmlformats.org/presentationml/2006/ole">
             <mc:AlternateContent xmlns:mc="http://schemas.openxmlformats.org/markup-compatibility/2006">
               <mc:Choice xmlns:v="urn:schemas-microsoft-com:vml" Requires="v">
-                <p:oleObj spid="_x0000_s6171" name="Objeto da Shell do Packager" showAsIcon="1" r:id="rId3" imgW="696600" imgH="437400" progId="Package">
+                <p:oleObj spid="_x0000_s6181" name="Objeto da Shell do Packager" showAsIcon="1" r:id="rId3" imgW="696600" imgH="437400" progId="Package">
                   <p:embed/>
                 </p:oleObj>
               </mc:Choice>
@@ -16676,7 +16657,7 @@
           <a:graphicData uri="http://schemas.openxmlformats.org/presentationml/2006/ole">
             <mc:AlternateContent xmlns:mc="http://schemas.openxmlformats.org/markup-compatibility/2006">
               <mc:Choice xmlns:v="urn:schemas-microsoft-com:vml" Requires="v">
-                <p:oleObj spid="_x0000_s6172" name="Objeto da Shell do Packager" showAsIcon="1" r:id="rId5" imgW="1374480" imgH="543600" progId="Package">
+                <p:oleObj spid="_x0000_s6182" name="Objeto da Shell do Packager" showAsIcon="1" r:id="rId5" imgW="1374480" imgH="543600" progId="Package">
                   <p:embed/>
                 </p:oleObj>
               </mc:Choice>
@@ -18452,7 +18433,7 @@
           <a:graphicData uri="http://schemas.openxmlformats.org/presentationml/2006/ole">
             <mc:AlternateContent xmlns:mc="http://schemas.openxmlformats.org/markup-compatibility/2006">
               <mc:Choice xmlns:v="urn:schemas-microsoft-com:vml" Requires="v">
-                <p:oleObj spid="_x0000_s6173" name="Objeto da Shell do Packager" showAsIcon="1" r:id="rId7" imgW="1309320" imgH="437400" progId="Package">
+                <p:oleObj spid="_x0000_s6183" name="Objeto da Shell do Packager" showAsIcon="1" r:id="rId7" imgW="1309320" imgH="437400" progId="Package">
                   <p:embed/>
                 </p:oleObj>
               </mc:Choice>
@@ -18603,7 +18584,7 @@
           <a:graphicData uri="http://schemas.openxmlformats.org/presentationml/2006/ole">
             <mc:AlternateContent xmlns:mc="http://schemas.openxmlformats.org/markup-compatibility/2006">
               <mc:Choice xmlns:v="urn:schemas-microsoft-com:vml" Requires="v">
-                <p:oleObj spid="_x0000_s6174" name="Objeto da Shell do Packager" showAsIcon="1" r:id="rId9" imgW="877320" imgH="437400" progId="Package">
+                <p:oleObj spid="_x0000_s6184" name="Objeto da Shell do Packager" showAsIcon="1" r:id="rId9" imgW="877320" imgH="437400" progId="Package">
                   <p:embed/>
                 </p:oleObj>
               </mc:Choice>
@@ -18754,7 +18735,7 @@
           <a:graphicData uri="http://schemas.openxmlformats.org/presentationml/2006/ole">
             <mc:AlternateContent xmlns:mc="http://schemas.openxmlformats.org/markup-compatibility/2006">
               <mc:Choice xmlns:v="urn:schemas-microsoft-com:vml" Requires="v">
-                <p:oleObj spid="_x0000_s6175" name="Objeto da Shell do Packager" showAsIcon="1" r:id="rId11" imgW="1425600" imgH="437400" progId="Package">
+                <p:oleObj spid="_x0000_s6185" name="Objeto da Shell do Packager" showAsIcon="1" r:id="rId11" imgW="1425600" imgH="437400" progId="Package">
                   <p:embed/>
                 </p:oleObj>
               </mc:Choice>
@@ -18905,7 +18886,7 @@
           <a:graphicData uri="http://schemas.openxmlformats.org/presentationml/2006/ole">
             <mc:AlternateContent xmlns:mc="http://schemas.openxmlformats.org/markup-compatibility/2006">
               <mc:Choice xmlns:v="urn:schemas-microsoft-com:vml" Requires="v">
-                <p:oleObj spid="_x0000_s6176" name="Objeto da Shell do Packager" showAsIcon="1" r:id="rId13" imgW="1890000" imgH="437400" progId="Package">
+                <p:oleObj spid="_x0000_s6186" name="Objeto da Shell do Packager" showAsIcon="1" r:id="rId13" imgW="1890000" imgH="437400" progId="Package">
                   <p:embed/>
                 </p:oleObj>
               </mc:Choice>
@@ -20812,7 +20793,7 @@
           <a:graphicData uri="http://schemas.openxmlformats.org/presentationml/2006/ole">
             <mc:AlternateContent xmlns:mc="http://schemas.openxmlformats.org/markup-compatibility/2006">
               <mc:Choice xmlns:v="urn:schemas-microsoft-com:vml" Requires="v">
-                <p:oleObj spid="_x0000_s6177" name="Objeto da Shell do Packager" showAsIcon="1" r:id="rId15" imgW="980280" imgH="347400" progId="Package">
+                <p:oleObj spid="_x0000_s6187" name="Objeto da Shell do Packager" showAsIcon="1" r:id="rId15" imgW="980280" imgH="347400" progId="Package">
                   <p:embed/>
                 </p:oleObj>
               </mc:Choice>
@@ -20963,7 +20944,7 @@
           <a:graphicData uri="http://schemas.openxmlformats.org/presentationml/2006/ole">
             <mc:AlternateContent xmlns:mc="http://schemas.openxmlformats.org/markup-compatibility/2006">
               <mc:Choice xmlns:v="urn:schemas-microsoft-com:vml" Requires="v">
-                <p:oleObj spid="_x0000_s6178" name="Objeto da Shell do Packager" showAsIcon="1" r:id="rId17" imgW="909360" imgH="437400" progId="Package">
+                <p:oleObj spid="_x0000_s6188" name="Objeto da Shell do Packager" showAsIcon="1" r:id="rId17" imgW="909360" imgH="437400" progId="Package">
                   <p:embed/>
                 </p:oleObj>
               </mc:Choice>
@@ -21114,7 +21095,7 @@
           <a:graphicData uri="http://schemas.openxmlformats.org/presentationml/2006/ole">
             <mc:AlternateContent xmlns:mc="http://schemas.openxmlformats.org/markup-compatibility/2006">
               <mc:Choice xmlns:v="urn:schemas-microsoft-com:vml" Requires="v">
-                <p:oleObj spid="_x0000_s6179" name="Objeto da Shell do Packager" showAsIcon="1" r:id="rId19" imgW="1238400" imgH="437400" progId="Package">
+                <p:oleObj spid="_x0000_s6189" name="Objeto da Shell do Packager" showAsIcon="1" r:id="rId19" imgW="1238400" imgH="437400" progId="Package">
                   <p:embed/>
                 </p:oleObj>
               </mc:Choice>
@@ -21265,7 +21246,7 @@
           <a:graphicData uri="http://schemas.openxmlformats.org/presentationml/2006/ole">
             <mc:AlternateContent xmlns:mc="http://schemas.openxmlformats.org/markup-compatibility/2006">
               <mc:Choice xmlns:v="urn:schemas-microsoft-com:vml" Requires="v">
-                <p:oleObj spid="_x0000_s6180" name="Objeto da Shell do Packager" showAsIcon="1" r:id="rId21" imgW="1109520" imgH="347400" progId="Package">
+                <p:oleObj spid="_x0000_s6190" name="Objeto da Shell do Packager" showAsIcon="1" r:id="rId21" imgW="1109520" imgH="347400" progId="Package">
                   <p:embed/>
                 </p:oleObj>
               </mc:Choice>

</xml_diff>